<commit_message>
Adiciona resultados da iteração 5
</commit_message>
<xml_diff>
--- a/Acompanhamento/iteração 05/Plano_de_Iteracao5.pptx
+++ b/Acompanhamento/iteração 05/Plano_de_Iteracao5.pptx
@@ -17990,7 +17990,7 @@
           <p:nvPr>
             <p:extLst>
               <p:ext uri="{D42A27DB-BD31-4B8C-83A1-F6EECF244321}">
-                <p14:modId xmlns:p14="http://schemas.microsoft.com/office/powerpoint/2010/main" val="2051337056"/>
+                <p14:modId xmlns:p14="http://schemas.microsoft.com/office/powerpoint/2010/main" val="146169135"/>
               </p:ext>
             </p:extLst>
           </p:nvPr>
@@ -19972,8 +19972,8 @@
                   </a:ext>
                 </a:extLst>
               </a:tr>
-              <a:tr h="828225">
-                <a:tc gridSpan="3">
+              <a:tr h="1665975">
+                <a:tc gridSpan="5">
                   <a:txBody>
                     <a:bodyPr/>
                     <a:lstStyle/>
@@ -19988,14 +19988,22 @@
                         <a:spcAft>
                           <a:spcPts val="0"/>
                         </a:spcAft>
+                        <a:buClr>
+                          <a:schemeClr val="dk1"/>
+                        </a:buClr>
+                        <a:buSzPts val="1100"/>
+                        <a:buFont typeface="Arial"/>
                         <a:buNone/>
                       </a:pPr>
-                      <a:endParaRPr sz="1000" dirty="0">
-                        <a:latin typeface="Roboto"/>
-                        <a:ea typeface="Roboto"/>
-                        <a:cs typeface="Roboto"/>
-                        <a:sym typeface="Roboto"/>
-                      </a:endParaRPr>
+                      <a:r>
+                        <a:rPr lang="pt-BR" sz="1000" dirty="0">
+                          <a:latin typeface="Roboto"/>
+                          <a:ea typeface="Roboto"/>
+                          <a:cs typeface="Roboto"/>
+                          <a:sym typeface="Roboto"/>
+                        </a:rPr>
+                        <a:t>Implementar Autenticação e permissão dos Usuários</a:t>
+                      </a:r>
                     </a:p>
                   </a:txBody>
                   <a:tcPr marL="91425" marR="91425" marT="91425" marB="91425" anchor="ctr">
@@ -20008,14 +20016,14 @@
                       <a:headEnd type="none" w="sm" len="sm"/>
                       <a:tailEnd type="none" w="sm" len="sm"/>
                     </a:lnL>
-                    <a:lnR w="9525" cap="flat" cmpd="sng" algn="ctr">
+                    <a:lnR w="12700" cap="flat" cmpd="sng" algn="ctr">
                       <a:solidFill>
-                        <a:srgbClr val="9E9E9E"/>
+                        <a:schemeClr val="tx1"/>
                       </a:solidFill>
                       <a:prstDash val="solid"/>
                       <a:round/>
-                      <a:headEnd type="none" w="sm" len="sm"/>
-                      <a:tailEnd type="none" w="sm" len="sm"/>
+                      <a:headEnd type="none" w="med" len="med"/>
+                      <a:tailEnd type="none" w="med" len="med"/>
                     </a:lnR>
                     <a:lnT w="9525" cap="flat" cmpd="sng">
                       <a:solidFill>
@@ -20026,8 +20034,10 @@
                       <a:headEnd type="none" w="sm" len="sm"/>
                       <a:tailEnd type="none" w="sm" len="sm"/>
                     </a:lnT>
-                    <a:lnB w="9525" cap="flat" cmpd="sng">
-                      <a:noFill/>
+                    <a:lnB w="9525" cap="flat" cmpd="sng" algn="ctr">
+                      <a:solidFill>
+                        <a:srgbClr val="9E9E9E"/>
+                      </a:solidFill>
                       <a:prstDash val="solid"/>
                       <a:round/>
                       <a:headEnd type="none" w="sm" len="sm"/>
@@ -20174,7 +20184,7 @@
                     </a:solidFill>
                   </a:tcPr>
                 </a:tc>
-                <a:tc>
+                <a:tc hMerge="1">
                   <a:txBody>
                     <a:bodyPr/>
                     <a:lstStyle/>
@@ -20191,42 +20201,6 @@
                         </a:spcAft>
                         <a:buNone/>
                       </a:pPr>
-                      <a:r>
-                        <a:rPr lang="en-US" sz="1000" dirty="0" err="1">
-                          <a:solidFill>
-                            <a:schemeClr val="dk1"/>
-                          </a:solidFill>
-                          <a:latin typeface="Roboto"/>
-                          <a:ea typeface="Roboto"/>
-                          <a:cs typeface="Roboto"/>
-                          <a:sym typeface="Roboto"/>
-                        </a:rPr>
-                        <a:t>Implementar</a:t>
-                      </a:r>
-                      <a:r>
-                        <a:rPr lang="en-US" sz="1000" dirty="0">
-                          <a:solidFill>
-                            <a:schemeClr val="dk1"/>
-                          </a:solidFill>
-                          <a:latin typeface="Roboto"/>
-                          <a:ea typeface="Roboto"/>
-                          <a:cs typeface="Roboto"/>
-                          <a:sym typeface="Roboto"/>
-                        </a:rPr>
-                        <a:t> testes de </a:t>
-                      </a:r>
-                      <a:r>
-                        <a:rPr lang="en-US" sz="1000" dirty="0" err="1">
-                          <a:solidFill>
-                            <a:schemeClr val="dk1"/>
-                          </a:solidFill>
-                          <a:latin typeface="Roboto"/>
-                          <a:ea typeface="Roboto"/>
-                          <a:cs typeface="Roboto"/>
-                          <a:sym typeface="Roboto"/>
-                        </a:rPr>
-                        <a:t>unidade</a:t>
-                      </a:r>
                       <a:endParaRPr sz="1000" dirty="0">
                         <a:latin typeface="Roboto"/>
                         <a:ea typeface="Roboto"/>
@@ -20245,7 +20219,7 @@
                       <a:headEnd type="none" w="sm" len="sm"/>
                       <a:tailEnd type="none" w="sm" len="sm"/>
                     </a:lnL>
-                    <a:lnR w="9525" cap="flat" cmpd="sng">
+                    <a:lnR w="9525" cap="flat" cmpd="sng" algn="ctr">
                       <a:solidFill>
                         <a:srgbClr val="9E9E9E"/>
                       </a:solidFill>
@@ -20263,7 +20237,7 @@
                       <a:headEnd type="none" w="sm" len="sm"/>
                       <a:tailEnd type="none" w="sm" len="sm"/>
                     </a:lnT>
-                    <a:lnB w="9525" cap="flat" cmpd="sng">
+                    <a:lnB w="9525" cap="flat" cmpd="sng" algn="ctr">
                       <a:solidFill>
                         <a:srgbClr val="9E9E9E"/>
                       </a:solidFill>
@@ -20277,7 +20251,7 @@
                     </a:solidFill>
                   </a:tcPr>
                 </a:tc>
-                <a:tc>
+                <a:tc hMerge="1">
                   <a:txBody>
                     <a:bodyPr/>
                     <a:lstStyle/>
@@ -20294,19 +20268,7 @@
                         </a:spcAft>
                         <a:buNone/>
                       </a:pPr>
-                      <a:r>
-                        <a:rPr lang="en-US" sz="1000">
-                          <a:solidFill>
-                            <a:schemeClr val="dk1"/>
-                          </a:solidFill>
-                          <a:latin typeface="Roboto"/>
-                          <a:ea typeface="Roboto"/>
-                          <a:cs typeface="Roboto"/>
-                          <a:sym typeface="Roboto"/>
-                        </a:rPr>
-                        <a:t>Implementar testes de integração</a:t>
-                      </a:r>
-                      <a:endParaRPr sz="1000">
+                      <a:endParaRPr sz="1000" dirty="0">
                         <a:latin typeface="Roboto"/>
                         <a:ea typeface="Roboto"/>
                         <a:cs typeface="Roboto"/>
@@ -20324,7 +20286,7 @@
                       <a:headEnd type="none" w="sm" len="sm"/>
                       <a:tailEnd type="none" w="sm" len="sm"/>
                     </a:lnL>
-                    <a:lnR w="9525" cap="flat" cmpd="sng">
+                    <a:lnR w="9525" cap="flat" cmpd="sng" algn="ctr">
                       <a:solidFill>
                         <a:srgbClr val="9E9E9E"/>
                       </a:solidFill>
@@ -20342,7 +20304,7 @@
                       <a:headEnd type="none" w="sm" len="sm"/>
                       <a:tailEnd type="none" w="sm" len="sm"/>
                     </a:lnT>
-                    <a:lnB w="9525" cap="flat" cmpd="sng">
+                    <a:lnB w="9525" cap="flat" cmpd="sng" algn="ctr">
                       <a:solidFill>
                         <a:srgbClr val="9E9E9E"/>
                       </a:solidFill>
@@ -20356,83 +20318,7 @@
                     </a:solidFill>
                   </a:tcPr>
                 </a:tc>
-                <a:tc>
-                  <a:txBody>
-                    <a:bodyPr/>
-                    <a:lstStyle/>
-                    <a:p>
-                      <a:pPr marL="0" lvl="0" indent="0" algn="ctr" rtl="0">
-                        <a:lnSpc>
-                          <a:spcPct val="115000"/>
-                        </a:lnSpc>
-                        <a:spcBef>
-                          <a:spcPts val="0"/>
-                        </a:spcBef>
-                        <a:spcAft>
-                          <a:spcPts val="0"/>
-                        </a:spcAft>
-                        <a:buNone/>
-                      </a:pPr>
-                      <a:r>
-                        <a:rPr lang="en-US" sz="1000">
-                          <a:latin typeface="Roboto"/>
-                          <a:ea typeface="Roboto"/>
-                          <a:cs typeface="Roboto"/>
-                          <a:sym typeface="Roboto"/>
-                        </a:rPr>
-                        <a:t>Realizar teste de sistema</a:t>
-                      </a:r>
-                      <a:endParaRPr sz="1000">
-                        <a:latin typeface="Roboto"/>
-                        <a:ea typeface="Roboto"/>
-                        <a:cs typeface="Roboto"/>
-                        <a:sym typeface="Roboto"/>
-                      </a:endParaRPr>
-                    </a:p>
-                  </a:txBody>
-                  <a:tcPr marL="91425" marR="91425" marT="91425" marB="91425" anchor="ctr">
-                    <a:lnL w="9525" cap="flat" cmpd="sng">
-                      <a:solidFill>
-                        <a:srgbClr val="9E9E9E"/>
-                      </a:solidFill>
-                      <a:prstDash val="solid"/>
-                      <a:round/>
-                      <a:headEnd type="none" w="sm" len="sm"/>
-                      <a:tailEnd type="none" w="sm" len="sm"/>
-                    </a:lnL>
-                    <a:lnR w="9525" cap="flat" cmpd="sng">
-                      <a:solidFill>
-                        <a:srgbClr val="9E9E9E"/>
-                      </a:solidFill>
-                      <a:prstDash val="solid"/>
-                      <a:round/>
-                      <a:headEnd type="none" w="sm" len="sm"/>
-                      <a:tailEnd type="none" w="sm" len="sm"/>
-                    </a:lnR>
-                    <a:lnT w="9525" cap="flat" cmpd="sng">
-                      <a:solidFill>
-                        <a:srgbClr val="9E9E9E"/>
-                      </a:solidFill>
-                      <a:prstDash val="solid"/>
-                      <a:round/>
-                      <a:headEnd type="none" w="sm" len="sm"/>
-                      <a:tailEnd type="none" w="sm" len="sm"/>
-                    </a:lnT>
-                    <a:lnB w="9525" cap="flat" cmpd="sng">
-                      <a:solidFill>
-                        <a:srgbClr val="9E9E9E"/>
-                      </a:solidFill>
-                      <a:prstDash val="solid"/>
-                      <a:round/>
-                      <a:headEnd type="none" w="sm" len="sm"/>
-                      <a:tailEnd type="none" w="sm" len="sm"/>
-                    </a:lnB>
-                    <a:solidFill>
-                      <a:srgbClr val="C9DAF8"/>
-                    </a:solidFill>
-                  </a:tcPr>
-                </a:tc>
-                <a:tc>
+                <a:tc gridSpan="2">
                   <a:txBody>
                     <a:bodyPr/>
                     <a:lstStyle/>
@@ -20455,17 +20341,80 @@
                         <a:buNone/>
                       </a:pPr>
                       <a:r>
-                        <a:rPr lang="en-US" sz="1000">
-                          <a:solidFill>
-                            <a:schemeClr val="dk1"/>
-                          </a:solidFill>
+                        <a:rPr lang="pt-BR" sz="1000" dirty="0">
                           <a:latin typeface="Roboto"/>
                           <a:ea typeface="Roboto"/>
-                          <a:cs typeface="Roboto"/>
                           <a:sym typeface="Roboto"/>
                         </a:rPr>
                         <a:t>Possíveis ajustes</a:t>
                       </a:r>
+                      <a:endParaRPr sz="1000" dirty="0"/>
+                    </a:p>
+                  </a:txBody>
+                  <a:tcPr marL="91425" marR="91425" marT="91425" marB="91425" anchor="ctr">
+                    <a:lnL w="12700" cap="flat" cmpd="sng" algn="ctr">
+                      <a:solidFill>
+                        <a:schemeClr val="tx1"/>
+                      </a:solidFill>
+                      <a:prstDash val="solid"/>
+                      <a:round/>
+                      <a:headEnd type="none" w="med" len="med"/>
+                      <a:tailEnd type="none" w="med" len="med"/>
+                    </a:lnL>
+                    <a:lnR w="9525" cap="flat" cmpd="sng" algn="ctr">
+                      <a:solidFill>
+                        <a:srgbClr val="9E9E9E"/>
+                      </a:solidFill>
+                      <a:prstDash val="solid"/>
+                      <a:round/>
+                      <a:headEnd type="none" w="sm" len="sm"/>
+                      <a:tailEnd type="none" w="sm" len="sm"/>
+                    </a:lnR>
+                    <a:lnT w="9525" cap="flat" cmpd="sng">
+                      <a:solidFill>
+                        <a:srgbClr val="9E9E9E"/>
+                      </a:solidFill>
+                      <a:prstDash val="solid"/>
+                      <a:round/>
+                      <a:headEnd type="none" w="sm" len="sm"/>
+                      <a:tailEnd type="none" w="sm" len="sm"/>
+                    </a:lnT>
+                    <a:lnB w="9525" cap="flat" cmpd="sng" algn="ctr">
+                      <a:solidFill>
+                        <a:srgbClr val="9E9E9E"/>
+                      </a:solidFill>
+                      <a:prstDash val="solid"/>
+                      <a:round/>
+                      <a:headEnd type="none" w="sm" len="sm"/>
+                      <a:tailEnd type="none" w="sm" len="sm"/>
+                    </a:lnB>
+                    <a:solidFill>
+                      <a:schemeClr val="bg1"/>
+                    </a:solidFill>
+                  </a:tcPr>
+                </a:tc>
+                <a:tc hMerge="1">
+                  <a:txBody>
+                    <a:bodyPr/>
+                    <a:lstStyle/>
+                    <a:p>
+                      <a:pPr marL="0" lvl="0" indent="0" algn="ctr" rtl="0">
+                        <a:lnSpc>
+                          <a:spcPct val="115000"/>
+                        </a:lnSpc>
+                        <a:spcBef>
+                          <a:spcPts val="0"/>
+                        </a:spcBef>
+                        <a:spcAft>
+                          <a:spcPts val="0"/>
+                        </a:spcAft>
+                        <a:buClr>
+                          <a:schemeClr val="dk1"/>
+                        </a:buClr>
+                        <a:buSzPts val="1100"/>
+                        <a:buFont typeface="Arial"/>
+                        <a:buNone/>
+                      </a:pPr>
                       <a:endParaRPr/>
                     </a:p>
                   </a:txBody>
@@ -20514,318 +20463,6 @@
                 <a:extLst>
                   <a:ext uri="{0D108BD9-81ED-4DB2-BD59-A6C34878D82A}">
                     <a16:rowId xmlns:a16="http://schemas.microsoft.com/office/drawing/2014/main" val="10004"/>
-                  </a:ext>
-                </a:extLst>
-              </a:tr>
-              <a:tr h="837750">
-                <a:tc gridSpan="5">
-                  <a:txBody>
-                    <a:bodyPr/>
-                    <a:lstStyle/>
-                    <a:p>
-                      <a:pPr marL="0" lvl="0" indent="0" algn="ctr" rtl="0">
-                        <a:lnSpc>
-                          <a:spcPct val="115000"/>
-                        </a:lnSpc>
-                        <a:spcBef>
-                          <a:spcPts val="0"/>
-                        </a:spcBef>
-                        <a:spcAft>
-                          <a:spcPts val="0"/>
-                        </a:spcAft>
-                        <a:buClr>
-                          <a:schemeClr val="dk1"/>
-                        </a:buClr>
-                        <a:buSzPts val="1100"/>
-                        <a:buFont typeface="Arial"/>
-                        <a:buNone/>
-                      </a:pPr>
-                      <a:r>
-                        <a:rPr lang="pt-BR" sz="1000" dirty="0">
-                          <a:latin typeface="Roboto"/>
-                          <a:ea typeface="Roboto"/>
-                          <a:cs typeface="Roboto"/>
-                          <a:sym typeface="Roboto"/>
-                        </a:rPr>
-                        <a:t>Implementar Autenticação e permissão dos Usuários</a:t>
-                      </a:r>
-                    </a:p>
-                  </a:txBody>
-                  <a:tcPr marL="91425" marR="91425" marT="91425" marB="91425" anchor="ctr">
-                    <a:lnL w="9525" cap="flat" cmpd="sng">
-                      <a:solidFill>
-                        <a:srgbClr val="9E9E9E"/>
-                      </a:solidFill>
-                      <a:prstDash val="solid"/>
-                      <a:round/>
-                      <a:headEnd type="none" w="sm" len="sm"/>
-                      <a:tailEnd type="none" w="sm" len="sm"/>
-                    </a:lnL>
-                    <a:lnR w="9525" cap="flat" cmpd="sng" algn="ctr">
-                      <a:solidFill>
-                        <a:srgbClr val="9E9E9E"/>
-                      </a:solidFill>
-                      <a:prstDash val="solid"/>
-                      <a:round/>
-                      <a:headEnd type="none" w="sm" len="sm"/>
-                      <a:tailEnd type="none" w="sm" len="sm"/>
-                    </a:lnR>
-                    <a:lnT w="9525" cap="flat" cmpd="sng">
-                      <a:noFill/>
-                      <a:prstDash val="solid"/>
-                      <a:round/>
-                      <a:headEnd type="none" w="sm" len="sm"/>
-                      <a:tailEnd type="none" w="sm" len="sm"/>
-                    </a:lnT>
-                    <a:lnB w="9525" cap="flat" cmpd="sng" algn="ctr">
-                      <a:solidFill>
-                        <a:srgbClr val="9E9E9E"/>
-                      </a:solidFill>
-                      <a:prstDash val="solid"/>
-                      <a:round/>
-                      <a:headEnd type="none" w="sm" len="sm"/>
-                      <a:tailEnd type="none" w="sm" len="sm"/>
-                    </a:lnB>
-                    <a:solidFill>
-                      <a:schemeClr val="bg1">
-                        <a:lumMod val="75000"/>
-                      </a:schemeClr>
-                    </a:solidFill>
-                  </a:tcPr>
-                </a:tc>
-                <a:tc hMerge="1">
-                  <a:txBody>
-                    <a:bodyPr/>
-                    <a:lstStyle/>
-                    <a:p>
-                      <a:endParaRPr lang="pt-BR"/>
-                    </a:p>
-                  </a:txBody>
-                  <a:tcPr/>
-                </a:tc>
-                <a:tc hMerge="1">
-                  <a:txBody>
-                    <a:bodyPr/>
-                    <a:lstStyle/>
-                    <a:p>
-                      <a:pPr marL="0" lvl="0" indent="0" algn="ctr" rtl="0">
-                        <a:lnSpc>
-                          <a:spcPct val="115000"/>
-                        </a:lnSpc>
-                        <a:spcBef>
-                          <a:spcPts val="0"/>
-                        </a:spcBef>
-                        <a:spcAft>
-                          <a:spcPts val="0"/>
-                        </a:spcAft>
-                        <a:buNone/>
-                      </a:pPr>
-                      <a:endParaRPr dirty="0"/>
-                    </a:p>
-                  </a:txBody>
-                  <a:tcPr marL="91425" marR="91425" marT="91425" marB="91425" anchor="ctr">
-                    <a:lnL w="9525" cap="flat" cmpd="sng">
-                      <a:solidFill>
-                        <a:srgbClr val="9E9E9E"/>
-                      </a:solidFill>
-                      <a:prstDash val="solid"/>
-                      <a:round/>
-                      <a:headEnd type="none" w="sm" len="sm"/>
-                      <a:tailEnd type="none" w="sm" len="sm"/>
-                    </a:lnL>
-                    <a:lnR w="9525" cap="flat" cmpd="sng">
-                      <a:solidFill>
-                        <a:srgbClr val="9E9E9E"/>
-                      </a:solidFill>
-                      <a:prstDash val="solid"/>
-                      <a:round/>
-                      <a:headEnd type="none" w="sm" len="sm"/>
-                      <a:tailEnd type="none" w="sm" len="sm"/>
-                    </a:lnR>
-                    <a:lnT w="9525" cap="flat" cmpd="sng">
-                      <a:solidFill>
-                        <a:srgbClr val="9E9E9E"/>
-                      </a:solidFill>
-                      <a:prstDash val="solid"/>
-                      <a:round/>
-                      <a:headEnd type="none" w="sm" len="sm"/>
-                      <a:tailEnd type="none" w="sm" len="sm"/>
-                    </a:lnT>
-                    <a:lnB w="9525" cap="flat" cmpd="sng">
-                      <a:solidFill>
-                        <a:srgbClr val="9E9E9E"/>
-                      </a:solidFill>
-                      <a:prstDash val="solid"/>
-                      <a:round/>
-                      <a:headEnd type="none" w="sm" len="sm"/>
-                      <a:tailEnd type="none" w="sm" len="sm"/>
-                    </a:lnB>
-                    <a:solidFill>
-                      <a:srgbClr val="FFF2CC"/>
-                    </a:solidFill>
-                  </a:tcPr>
-                </a:tc>
-                <a:tc hMerge="1">
-                  <a:txBody>
-                    <a:bodyPr/>
-                    <a:lstStyle/>
-                    <a:p>
-                      <a:endParaRPr lang="pt-BR"/>
-                    </a:p>
-                  </a:txBody>
-                  <a:tcPr/>
-                </a:tc>
-                <a:tc hMerge="1">
-                  <a:txBody>
-                    <a:bodyPr/>
-                    <a:lstStyle/>
-                    <a:p>
-                      <a:endParaRPr lang="pt-BR"/>
-                    </a:p>
-                  </a:txBody>
-                  <a:tcPr/>
-                </a:tc>
-                <a:tc gridSpan="2">
-                  <a:txBody>
-                    <a:bodyPr/>
-                    <a:lstStyle/>
-                    <a:p>
-                      <a:pPr marL="0" lvl="0" indent="0" algn="ctr" rtl="0">
-                        <a:lnSpc>
-                          <a:spcPct val="115000"/>
-                        </a:lnSpc>
-                        <a:spcBef>
-                          <a:spcPts val="0"/>
-                        </a:spcBef>
-                        <a:spcAft>
-                          <a:spcPts val="0"/>
-                        </a:spcAft>
-                        <a:buClr>
-                          <a:schemeClr val="dk1"/>
-                        </a:buClr>
-                        <a:buSzPts val="1100"/>
-                        <a:buFont typeface="Arial"/>
-                        <a:buNone/>
-                      </a:pPr>
-                      <a:r>
-                        <a:rPr lang="pt-BR" sz="1000" dirty="0">
-                          <a:solidFill>
-                            <a:schemeClr val="dk1"/>
-                          </a:solidFill>
-                          <a:latin typeface="Roboto"/>
-                          <a:ea typeface="Roboto"/>
-                          <a:cs typeface="Roboto"/>
-                          <a:sym typeface="Roboto"/>
-                        </a:rPr>
-                        <a:t>Implementar Gerenciamento de Pagamentos</a:t>
-                      </a:r>
-                      <a:endParaRPr dirty="0"/>
-                    </a:p>
-                  </a:txBody>
-                  <a:tcPr marL="91425" marR="91425" marT="91425" marB="91425" anchor="ctr">
-                    <a:lnL w="9525" cap="flat" cmpd="sng">
-                      <a:solidFill>
-                        <a:srgbClr val="9E9E9E"/>
-                      </a:solidFill>
-                      <a:prstDash val="solid"/>
-                      <a:round/>
-                      <a:headEnd type="none" w="sm" len="sm"/>
-                      <a:tailEnd type="none" w="sm" len="sm"/>
-                    </a:lnL>
-                    <a:lnR w="9525" cap="flat" cmpd="sng" algn="ctr">
-                      <a:solidFill>
-                        <a:srgbClr val="9E9E9E"/>
-                      </a:solidFill>
-                      <a:prstDash val="solid"/>
-                      <a:round/>
-                      <a:headEnd type="none" w="sm" len="sm"/>
-                      <a:tailEnd type="none" w="sm" len="sm"/>
-                    </a:lnR>
-                    <a:lnT w="9525" cap="flat" cmpd="sng">
-                      <a:solidFill>
-                        <a:srgbClr val="9E9E9E"/>
-                      </a:solidFill>
-                      <a:prstDash val="solid"/>
-                      <a:round/>
-                      <a:headEnd type="none" w="sm" len="sm"/>
-                      <a:tailEnd type="none" w="sm" len="sm"/>
-                    </a:lnT>
-                    <a:lnB w="9525" cap="flat" cmpd="sng" algn="ctr">
-                      <a:solidFill>
-                        <a:srgbClr val="9E9E9E"/>
-                      </a:solidFill>
-                      <a:prstDash val="solid"/>
-                      <a:round/>
-                      <a:headEnd type="none" w="sm" len="sm"/>
-                      <a:tailEnd type="none" w="sm" len="sm"/>
-                    </a:lnB>
-                    <a:solidFill>
-                      <a:srgbClr val="D9D2E9"/>
-                    </a:solidFill>
-                  </a:tcPr>
-                </a:tc>
-                <a:tc hMerge="1">
-                  <a:txBody>
-                    <a:bodyPr/>
-                    <a:lstStyle/>
-                    <a:p>
-                      <a:pPr marL="0" lvl="0" indent="0" algn="ctr" rtl="0">
-                        <a:spcBef>
-                          <a:spcPts val="0"/>
-                        </a:spcBef>
-                        <a:spcAft>
-                          <a:spcPts val="0"/>
-                        </a:spcAft>
-                        <a:buNone/>
-                      </a:pPr>
-                      <a:endParaRPr dirty="0"/>
-                    </a:p>
-                  </a:txBody>
-                  <a:tcPr marL="91425" marR="91425" marT="91425" marB="91425" anchor="ctr">
-                    <a:lnL w="9525" cap="flat" cmpd="sng">
-                      <a:solidFill>
-                        <a:srgbClr val="9E9E9E"/>
-                      </a:solidFill>
-                      <a:prstDash val="solid"/>
-                      <a:round/>
-                      <a:headEnd type="none" w="sm" len="sm"/>
-                      <a:tailEnd type="none" w="sm" len="sm"/>
-                    </a:lnL>
-                    <a:lnR w="9525" cap="flat" cmpd="sng">
-                      <a:solidFill>
-                        <a:srgbClr val="9E9E9E"/>
-                      </a:solidFill>
-                      <a:prstDash val="solid"/>
-                      <a:round/>
-                      <a:headEnd type="none" w="sm" len="sm"/>
-                      <a:tailEnd type="none" w="sm" len="sm"/>
-                    </a:lnR>
-                    <a:lnT w="9525" cap="flat" cmpd="sng">
-                      <a:solidFill>
-                        <a:srgbClr val="9E9E9E"/>
-                      </a:solidFill>
-                      <a:prstDash val="solid"/>
-                      <a:round/>
-                      <a:headEnd type="none" w="sm" len="sm"/>
-                      <a:tailEnd type="none" w="sm" len="sm"/>
-                    </a:lnT>
-                    <a:lnB w="9525" cap="flat" cmpd="sng">
-                      <a:solidFill>
-                        <a:srgbClr val="9E9E9E"/>
-                      </a:solidFill>
-                      <a:prstDash val="solid"/>
-                      <a:round/>
-                      <a:headEnd type="none" w="sm" len="sm"/>
-                      <a:tailEnd type="none" w="sm" len="sm"/>
-                    </a:lnB>
-                    <a:solidFill>
-                      <a:srgbClr val="F4CCCC"/>
-                    </a:solidFill>
-                  </a:tcPr>
-                </a:tc>
-                <a:extLst>
-                  <a:ext uri="{0D108BD9-81ED-4DB2-BD59-A6C34878D82A}">
-                    <a16:rowId xmlns:a16="http://schemas.microsoft.com/office/drawing/2014/main" val="10005"/>
                   </a:ext>
                 </a:extLst>
               </a:tr>

</xml_diff>